<commit_message>
Add: Finished practiceHarry, mid of practiceMona
</commit_message>
<xml_diff>
--- a/Resources/Semana 2 - Practicas.pptx
+++ b/Resources/Semana 2 - Practicas.pptx
@@ -3615,7 +3615,7 @@
           <p:nvPr>
             <p:extLst>
               <p:ext uri="{D42A27DB-BD31-4B8C-83A1-F6EECF244321}">
-                <p14:modId xmlns:p14="http://schemas.microsoft.com/office/powerpoint/2010/main" val="1730465433"/>
+                <p14:modId xmlns:p14="http://schemas.microsoft.com/office/powerpoint/2010/main" val="3543423777"/>
               </p:ext>
             </p:extLst>
           </p:nvPr>
@@ -3710,7 +3710,7 @@
                         <a:t> = "</a:t>
                       </a:r>
                       <a:r>
-                        <a:rPr lang="es-MX" sz="1600" dirty="0" err="1">
+                        <a:rPr lang="es-MX" sz="1600" u="sng" dirty="0" err="1">
                           <a:solidFill>
                             <a:schemeClr val="tx1"/>
                           </a:solidFill>
@@ -5108,6 +5108,21 @@
 </file>
 
 <file path=customXml/item1.xml><?xml version="1.0" encoding="utf-8"?>
+<p:properties xmlns:p="http://schemas.microsoft.com/office/2006/metadata/properties" xmlns:xsi="http://www.w3.org/2001/XMLSchema-instance" xmlns:pc="http://schemas.microsoft.com/office/infopath/2007/PartnerControls">
+  <documentManagement/>
+</p:properties>
+</file>
+
+<file path=customXml/item2.xml><?xml version="1.0" encoding="utf-8"?>
+<?mso-contentType ?>
+<FormTemplates xmlns="http://schemas.microsoft.com/sharepoint/v3/contenttype/forms">
+  <Display>DocumentLibraryForm</Display>
+  <Edit>DocumentLibraryForm</Edit>
+  <New>DocumentLibraryForm</New>
+</FormTemplates>
+</file>
+
+<file path=customXml/item3.xml><?xml version="1.0" encoding="utf-8"?>
 <ct:contentTypeSchema xmlns:ct="http://schemas.microsoft.com/office/2006/metadata/contentType" xmlns:ma="http://schemas.microsoft.com/office/2006/metadata/properties/metaAttributes" ct:_="" ma:_="" ma:contentTypeName="Documento" ma:contentTypeID="0x010100A9E6AB3E5637224095AA3595991B988B" ma:contentTypeVersion="4" ma:contentTypeDescription="Crear nuevo documento." ma:contentTypeScope="" ma:versionID="affe85054a514317e91be024b2b6369b">
   <xsd:schema xmlns:xsd="http://www.w3.org/2001/XMLSchema" xmlns:xs="http://www.w3.org/2001/XMLSchema" xmlns:p="http://schemas.microsoft.com/office/2006/metadata/properties" xmlns:ns3="ded871b6-30cc-4e81-94fc-91760012bfcc" targetNamespace="http://schemas.microsoft.com/office/2006/metadata/properties" ma:root="true" ma:fieldsID="860ff6e6c05f86e108ddd72e90b9e4a2" ns3:_="">
     <xsd:import namespace="ded871b6-30cc-4e81-94fc-91760012bfcc"/>
@@ -5253,22 +5268,31 @@
 </ct:contentTypeSchema>
 </file>
 
-<file path=customXml/item2.xml><?xml version="1.0" encoding="utf-8"?>
-<?mso-contentType ?>
-<FormTemplates xmlns="http://schemas.microsoft.com/sharepoint/v3/contenttype/forms">
-  <Display>DocumentLibraryForm</Display>
-  <Edit>DocumentLibraryForm</Edit>
-  <New>DocumentLibraryForm</New>
-</FormTemplates>
+<file path=customXml/itemProps1.xml><?xml version="1.0" encoding="utf-8"?>
+<ds:datastoreItem xmlns:ds="http://schemas.openxmlformats.org/officeDocument/2006/customXml" ds:itemID="{E11C980B-CCA7-440A-9904-999BFF72A119}">
+  <ds:schemaRefs>
+    <ds:schemaRef ds:uri="http://purl.org/dc/terms/"/>
+    <ds:schemaRef ds:uri="http://schemas.microsoft.com/office/infopath/2007/PartnerControls"/>
+    <ds:schemaRef ds:uri="http://schemas.microsoft.com/office/2006/documentManagement/types"/>
+    <ds:schemaRef ds:uri="ded871b6-30cc-4e81-94fc-91760012bfcc"/>
+    <ds:schemaRef ds:uri="http://schemas.openxmlformats.org/package/2006/metadata/core-properties"/>
+    <ds:schemaRef ds:uri="http://purl.org/dc/dcmitype/"/>
+    <ds:schemaRef ds:uri="http://schemas.microsoft.com/office/2006/metadata/properties"/>
+    <ds:schemaRef ds:uri="http://www.w3.org/XML/1998/namespace"/>
+    <ds:schemaRef ds:uri="http://purl.org/dc/elements/1.1/"/>
+  </ds:schemaRefs>
+</ds:datastoreItem>
 </file>
 
-<file path=customXml/item3.xml><?xml version="1.0" encoding="utf-8"?>
-<p:properties xmlns:p="http://schemas.microsoft.com/office/2006/metadata/properties" xmlns:xsi="http://www.w3.org/2001/XMLSchema-instance" xmlns:pc="http://schemas.microsoft.com/office/infopath/2007/PartnerControls">
-  <documentManagement/>
-</p:properties>
+<file path=customXml/itemProps2.xml><?xml version="1.0" encoding="utf-8"?>
+<ds:datastoreItem xmlns:ds="http://schemas.openxmlformats.org/officeDocument/2006/customXml" ds:itemID="{A0F91DA9-4C50-4D62-8B2C-4A5C10C5F77B}">
+  <ds:schemaRefs>
+    <ds:schemaRef ds:uri="http://schemas.microsoft.com/sharepoint/v3/contenttype/forms"/>
+  </ds:schemaRefs>
+</ds:datastoreItem>
 </file>
 
-<file path=customXml/itemProps1.xml><?xml version="1.0" encoding="utf-8"?>
+<file path=customXml/itemProps3.xml><?xml version="1.0" encoding="utf-8"?>
 <ds:datastoreItem xmlns:ds="http://schemas.openxmlformats.org/officeDocument/2006/customXml" ds:itemID="{9E589474-88D2-4CB2-A08B-7FC1CF5B7206}">
   <ds:schemaRefs>
     <ds:schemaRef ds:uri="http://schemas.microsoft.com/office/2006/metadata/contentType"/>
@@ -5284,28 +5308,4 @@
     <ds:schemaRef ds:uri="http://schemas.microsoft.com/internal/obd"/>
   </ds:schemaRefs>
 </ds:datastoreItem>
-</file>
-
-<file path=customXml/itemProps2.xml><?xml version="1.0" encoding="utf-8"?>
-<ds:datastoreItem xmlns:ds="http://schemas.openxmlformats.org/officeDocument/2006/customXml" ds:itemID="{A0F91DA9-4C50-4D62-8B2C-4A5C10C5F77B}">
-  <ds:schemaRefs>
-    <ds:schemaRef ds:uri="http://schemas.microsoft.com/sharepoint/v3/contenttype/forms"/>
-  </ds:schemaRefs>
-</ds:datastoreItem>
-</file>
-
-<file path=customXml/itemProps3.xml><?xml version="1.0" encoding="utf-8"?>
-<ds:datastoreItem xmlns:ds="http://schemas.openxmlformats.org/officeDocument/2006/customXml" ds:itemID="{E11C980B-CCA7-440A-9904-999BFF72A119}">
-  <ds:schemaRefs>
-    <ds:schemaRef ds:uri="http://purl.org/dc/terms/"/>
-    <ds:schemaRef ds:uri="http://schemas.microsoft.com/office/infopath/2007/PartnerControls"/>
-    <ds:schemaRef ds:uri="http://schemas.microsoft.com/office/2006/documentManagement/types"/>
-    <ds:schemaRef ds:uri="ded871b6-30cc-4e81-94fc-91760012bfcc"/>
-    <ds:schemaRef ds:uri="http://schemas.openxmlformats.org/package/2006/metadata/core-properties"/>
-    <ds:schemaRef ds:uri="http://purl.org/dc/dcmitype/"/>
-    <ds:schemaRef ds:uri="http://schemas.microsoft.com/office/2006/metadata/properties"/>
-    <ds:schemaRef ds:uri="http://www.w3.org/XML/1998/namespace"/>
-    <ds:schemaRef ds:uri="http://purl.org/dc/elements/1.1/"/>
-  </ds:schemaRefs>
-</ds:datastoreItem>
 </file>
</xml_diff>